<commit_message>
- Added docker file for heroku (just in case the CLI gives me issues)\n- Updated presentation
</commit_message>
<xml_diff>
--- a/presentation.pptx
+++ b/presentation.pptx
@@ -5,7 +5,7 @@
     <p:sldMasterId id="2147483935" r:id="rId1"/>
   </p:sldMasterIdLst>
   <p:notesMasterIdLst>
-    <p:notesMasterId r:id="rId15"/>
+    <p:notesMasterId r:id="rId16"/>
   </p:notesMasterIdLst>
   <p:sldIdLst>
     <p:sldId id="256" r:id="rId2"/>
@@ -20,7 +20,8 @@
     <p:sldId id="265" r:id="rId11"/>
     <p:sldId id="266" r:id="rId12"/>
     <p:sldId id="267" r:id="rId13"/>
-    <p:sldId id="268" r:id="rId14"/>
+    <p:sldId id="269" r:id="rId14"/>
+    <p:sldId id="268" r:id="rId15"/>
   </p:sldIdLst>
   <p:sldSz cx="12192000" cy="6858000"/>
   <p:notesSz cx="6858000" cy="9144000"/>
@@ -5411,6 +5412,620 @@
           <a:p>
             <a:r>
               <a:rPr lang="en-US" dirty="0" smtClean="0"/>
+              <a:t>Matching Back to</a:t>
+            </a:r>
+            <a:r>
+              <a:rPr lang="en-US" dirty="0" smtClean="0"/>
+              <a:t> 12-Factor</a:t>
+            </a:r>
+            <a:endParaRPr lang="en-US" dirty="0"/>
+          </a:p>
+        </p:txBody>
+      </p:sp>
+      <p:sp>
+        <p:nvSpPr>
+          <p:cNvPr id="3" name="Content Placeholder 2"/>
+          <p:cNvSpPr>
+            <a:spLocks noGrp="1"/>
+          </p:cNvSpPr>
+          <p:nvPr>
+            <p:ph idx="1"/>
+          </p:nvPr>
+        </p:nvSpPr>
+        <p:spPr>
+          <a:xfrm>
+            <a:off x="838200" y="1825625"/>
+            <a:ext cx="4939145" cy="4351338"/>
+          </a:xfrm>
+        </p:spPr>
+        <p:txBody>
+          <a:bodyPr>
+            <a:normAutofit fontScale="62500" lnSpcReduction="20000"/>
+          </a:bodyPr>
+          <a:lstStyle/>
+          <a:p>
+            <a:pPr marL="0" indent="0">
+              <a:buNone/>
+            </a:pPr>
+            <a:r>
+              <a:rPr lang="en-US" sz="2800" b="1" i="0" u="none" strike="noStrike" kern="1200" dirty="0" smtClean="0">
+                <a:solidFill>
+                  <a:schemeClr val="tx1"/>
+                </a:solidFill>
+                <a:effectLst/>
+                <a:latin typeface="+mn-lt"/>
+                <a:ea typeface="+mn-ea"/>
+                <a:cs typeface="+mn-cs"/>
+              </a:rPr>
+              <a:t>I. Codebase ✅</a:t>
+            </a:r>
+            <a:r>
+              <a:rPr lang="en-US" sz="2800" b="1" dirty="0" smtClean="0"/>
+              <a:t/>
+            </a:r>
+            <a:br>
+              <a:rPr lang="en-US" sz="2800" b="1" dirty="0" smtClean="0"/>
+            </a:br>
+            <a:r>
+              <a:rPr lang="en-US" sz="2800" b="0" i="0" kern="1200" dirty="0" smtClean="0">
+                <a:solidFill>
+                  <a:schemeClr val="tx1"/>
+                </a:solidFill>
+                <a:effectLst/>
+                <a:latin typeface="+mn-lt"/>
+                <a:ea typeface="+mn-ea"/>
+                <a:cs typeface="+mn-cs"/>
+              </a:rPr>
+              <a:t>One codebase managed in </a:t>
+            </a:r>
+            <a:r>
+              <a:rPr lang="en-US" sz="2800" b="0" i="0" kern="1200" dirty="0" err="1" smtClean="0">
+                <a:solidFill>
+                  <a:schemeClr val="tx1"/>
+                </a:solidFill>
+                <a:effectLst/>
+                <a:latin typeface="+mn-lt"/>
+                <a:ea typeface="+mn-ea"/>
+                <a:cs typeface="+mn-cs"/>
+              </a:rPr>
+              <a:t>git</a:t>
+            </a:r>
+            <a:r>
+              <a:rPr lang="en-US" sz="2800" b="0" i="0" kern="1200" dirty="0" smtClean="0">
+                <a:solidFill>
+                  <a:schemeClr val="tx1"/>
+                </a:solidFill>
+                <a:effectLst/>
+                <a:latin typeface="+mn-lt"/>
+                <a:ea typeface="+mn-ea"/>
+                <a:cs typeface="+mn-cs"/>
+              </a:rPr>
+              <a:t> for all environments</a:t>
+            </a:r>
+            <a:br>
+              <a:rPr lang="en-US" sz="2800" b="0" i="0" kern="1200" dirty="0" smtClean="0">
+                <a:solidFill>
+                  <a:schemeClr val="tx1"/>
+                </a:solidFill>
+                <a:effectLst/>
+                <a:latin typeface="+mn-lt"/>
+                <a:ea typeface="+mn-ea"/>
+                <a:cs typeface="+mn-cs"/>
+              </a:rPr>
+            </a:br>
+            <a:r>
+              <a:rPr lang="en-US" sz="2800" b="1" i="0" u="none" strike="noStrike" kern="1200" dirty="0" smtClean="0">
+                <a:solidFill>
+                  <a:schemeClr val="tx1"/>
+                </a:solidFill>
+                <a:effectLst/>
+                <a:latin typeface="+mn-lt"/>
+                <a:ea typeface="+mn-ea"/>
+                <a:cs typeface="+mn-cs"/>
+              </a:rPr>
+              <a:t>II. </a:t>
+            </a:r>
+            <a:r>
+              <a:rPr lang="en-US" sz="2800" b="1" dirty="0" smtClean="0"/>
+              <a:t>Dependencies ✅ </a:t>
+            </a:r>
+            <a:r>
+              <a:rPr lang="en-US" sz="2800" b="1" dirty="0" smtClean="0"/>
+              <a:t/>
+            </a:r>
+            <a:br>
+              <a:rPr lang="en-US" sz="2800" b="1" dirty="0" smtClean="0"/>
+            </a:br>
+            <a:r>
+              <a:rPr lang="en-US" sz="2800" b="0" i="0" kern="1200" dirty="0" smtClean="0">
+                <a:solidFill>
+                  <a:schemeClr val="tx1"/>
+                </a:solidFill>
+                <a:effectLst/>
+                <a:latin typeface="+mn-lt"/>
+                <a:ea typeface="+mn-ea"/>
+                <a:cs typeface="+mn-cs"/>
+              </a:rPr>
+              <a:t>Declared in </a:t>
+            </a:r>
+            <a:r>
+              <a:rPr lang="en-US" sz="2800" b="0" i="0" kern="1200" dirty="0" err="1" smtClean="0">
+                <a:solidFill>
+                  <a:schemeClr val="tx1"/>
+                </a:solidFill>
+                <a:effectLst/>
+                <a:latin typeface="Consolas" charset="0"/>
+                <a:ea typeface="Consolas" charset="0"/>
+                <a:cs typeface="Consolas" charset="0"/>
+              </a:rPr>
+              <a:t>pom.xml</a:t>
+            </a:r>
+            <a:r>
+              <a:rPr lang="en-US" sz="2800" b="0" i="0" kern="1200" dirty="0" smtClean="0">
+                <a:solidFill>
+                  <a:schemeClr val="tx1"/>
+                </a:solidFill>
+                <a:effectLst/>
+                <a:latin typeface="Consolas" charset="0"/>
+                <a:ea typeface="Consolas" charset="0"/>
+                <a:cs typeface="Consolas" charset="0"/>
+              </a:rPr>
+              <a:t> </a:t>
+            </a:r>
+            <a:r>
+              <a:rPr lang="en-US" sz="2800" b="0" i="0" kern="1200" dirty="0" smtClean="0">
+                <a:solidFill>
+                  <a:schemeClr val="tx1"/>
+                </a:solidFill>
+                <a:effectLst/>
+                <a:latin typeface="+mn-lt"/>
+                <a:ea typeface="+mn-ea"/>
+                <a:cs typeface="+mn-cs"/>
+              </a:rPr>
+              <a:t>file</a:t>
+            </a:r>
+            <a:br>
+              <a:rPr lang="en-US" sz="2800" b="0" i="0" kern="1200" dirty="0" smtClean="0">
+                <a:solidFill>
+                  <a:schemeClr val="tx1"/>
+                </a:solidFill>
+                <a:effectLst/>
+                <a:latin typeface="+mn-lt"/>
+                <a:ea typeface="+mn-ea"/>
+                <a:cs typeface="+mn-cs"/>
+              </a:rPr>
+            </a:br>
+            <a:r>
+              <a:rPr lang="en-US" sz="2800" b="1" i="0" u="none" strike="noStrike" kern="1200" dirty="0" smtClean="0">
+                <a:solidFill>
+                  <a:schemeClr val="tx1"/>
+                </a:solidFill>
+                <a:effectLst/>
+                <a:latin typeface="+mn-lt"/>
+                <a:ea typeface="+mn-ea"/>
+                <a:cs typeface="+mn-cs"/>
+              </a:rPr>
+              <a:t>III. </a:t>
+            </a:r>
+            <a:r>
+              <a:rPr lang="en-US" sz="2800" b="1" dirty="0" err="1" smtClean="0"/>
+              <a:t>Config</a:t>
+            </a:r>
+            <a:r>
+              <a:rPr lang="en-US" sz="2800" b="1" dirty="0" smtClean="0"/>
+              <a:t> ✅ </a:t>
+            </a:r>
+            <a:r>
+              <a:rPr lang="en-US" sz="2800" b="1" dirty="0" smtClean="0"/>
+              <a:t/>
+            </a:r>
+            <a:br>
+              <a:rPr lang="en-US" sz="2800" b="1" dirty="0" smtClean="0"/>
+            </a:br>
+            <a:r>
+              <a:rPr lang="en-US" sz="2800" b="0" i="0" kern="1200" dirty="0" smtClean="0">
+                <a:solidFill>
+                  <a:schemeClr val="tx1"/>
+                </a:solidFill>
+                <a:effectLst/>
+                <a:latin typeface="+mn-lt"/>
+                <a:ea typeface="+mn-ea"/>
+                <a:cs typeface="+mn-cs"/>
+              </a:rPr>
+              <a:t>DB string configured in ENV variable</a:t>
+            </a:r>
+            <a:br>
+              <a:rPr lang="en-US" sz="2800" b="0" i="0" kern="1200" dirty="0" smtClean="0">
+                <a:solidFill>
+                  <a:schemeClr val="tx1"/>
+                </a:solidFill>
+                <a:effectLst/>
+                <a:latin typeface="+mn-lt"/>
+                <a:ea typeface="+mn-ea"/>
+                <a:cs typeface="+mn-cs"/>
+              </a:rPr>
+            </a:br>
+            <a:r>
+              <a:rPr lang="en-US" sz="2800" b="1" i="0" u="none" strike="noStrike" kern="1200" dirty="0" smtClean="0">
+                <a:solidFill>
+                  <a:schemeClr val="tx1"/>
+                </a:solidFill>
+                <a:effectLst/>
+                <a:latin typeface="+mn-lt"/>
+                <a:ea typeface="+mn-ea"/>
+                <a:cs typeface="+mn-cs"/>
+              </a:rPr>
+              <a:t>IV. Backing </a:t>
+            </a:r>
+            <a:r>
+              <a:rPr lang="en-US" sz="2800" b="1" dirty="0" smtClean="0"/>
+              <a:t>services ✅ </a:t>
+            </a:r>
+            <a:r>
+              <a:rPr lang="en-US" sz="2800" b="1" dirty="0" smtClean="0"/>
+              <a:t/>
+            </a:r>
+            <a:br>
+              <a:rPr lang="en-US" sz="2800" b="1" dirty="0" smtClean="0"/>
+            </a:br>
+            <a:r>
+              <a:rPr lang="en-US" sz="2800" b="0" i="0" kern="1200" dirty="0" smtClean="0">
+                <a:solidFill>
+                  <a:schemeClr val="tx1"/>
+                </a:solidFill>
+                <a:effectLst/>
+                <a:latin typeface="+mn-lt"/>
+                <a:ea typeface="+mn-ea"/>
+                <a:cs typeface="+mn-cs"/>
+              </a:rPr>
+              <a:t>Treating PostgreSQL as just another service</a:t>
+            </a:r>
+            <a:br>
+              <a:rPr lang="en-US" sz="2800" b="0" i="0" kern="1200" dirty="0" smtClean="0">
+                <a:solidFill>
+                  <a:schemeClr val="tx1"/>
+                </a:solidFill>
+                <a:effectLst/>
+                <a:latin typeface="+mn-lt"/>
+                <a:ea typeface="+mn-ea"/>
+                <a:cs typeface="+mn-cs"/>
+              </a:rPr>
+            </a:br>
+            <a:r>
+              <a:rPr lang="en-US" sz="2800" b="1" i="0" u="none" strike="noStrike" kern="1200" dirty="0" smtClean="0">
+                <a:solidFill>
+                  <a:schemeClr val="tx1"/>
+                </a:solidFill>
+                <a:effectLst/>
+                <a:latin typeface="+mn-lt"/>
+                <a:ea typeface="+mn-ea"/>
+                <a:cs typeface="+mn-cs"/>
+              </a:rPr>
+              <a:t>V. Build, release, run </a:t>
+            </a:r>
+            <a:r>
+              <a:rPr lang="en-US" sz="2900" b="1" dirty="0"/>
+              <a:t>❌ </a:t>
+            </a:r>
+            <a:r>
+              <a:rPr lang="en-US" sz="2800" b="1" dirty="0" smtClean="0"/>
+              <a:t/>
+            </a:r>
+            <a:br>
+              <a:rPr lang="en-US" sz="2800" b="1" dirty="0" smtClean="0"/>
+            </a:br>
+            <a:r>
+              <a:rPr lang="en-US" sz="2800" dirty="0" smtClean="0"/>
+              <a:t>Will be handles by the PaaS</a:t>
+            </a:r>
+            <a:r>
+              <a:rPr lang="en-US" sz="2800" b="0" i="0" kern="1200" dirty="0" smtClean="0">
+                <a:solidFill>
+                  <a:schemeClr val="tx1"/>
+                </a:solidFill>
+                <a:effectLst/>
+                <a:latin typeface="+mn-lt"/>
+                <a:ea typeface="+mn-ea"/>
+                <a:cs typeface="+mn-cs"/>
+              </a:rPr>
+              <a:t/>
+            </a:r>
+            <a:br>
+              <a:rPr lang="en-US" sz="2800" b="0" i="0" kern="1200" dirty="0" smtClean="0">
+                <a:solidFill>
+                  <a:schemeClr val="tx1"/>
+                </a:solidFill>
+                <a:effectLst/>
+                <a:latin typeface="+mn-lt"/>
+                <a:ea typeface="+mn-ea"/>
+                <a:cs typeface="+mn-cs"/>
+              </a:rPr>
+            </a:br>
+            <a:r>
+              <a:rPr lang="en-US" sz="2800" b="1" i="0" u="none" strike="noStrike" kern="1200" dirty="0" smtClean="0">
+                <a:solidFill>
+                  <a:schemeClr val="tx1"/>
+                </a:solidFill>
+                <a:effectLst/>
+                <a:latin typeface="+mn-lt"/>
+                <a:ea typeface="+mn-ea"/>
+                <a:cs typeface="+mn-cs"/>
+              </a:rPr>
+              <a:t>VI. </a:t>
+            </a:r>
+            <a:r>
+              <a:rPr lang="en-US" sz="2800" b="1" dirty="0" smtClean="0"/>
+              <a:t>Processes ✅ </a:t>
+            </a:r>
+            <a:r>
+              <a:rPr lang="en-US" sz="2800" b="1" dirty="0" smtClean="0"/>
+              <a:t/>
+            </a:r>
+            <a:br>
+              <a:rPr lang="en-US" sz="2800" b="1" dirty="0" smtClean="0"/>
+            </a:br>
+            <a:r>
+              <a:rPr lang="en-US" sz="2800" b="0" i="0" kern="1200" dirty="0" smtClean="0">
+                <a:solidFill>
+                  <a:schemeClr val="tx1"/>
+                </a:solidFill>
+                <a:effectLst/>
+                <a:latin typeface="+mn-lt"/>
+                <a:ea typeface="+mn-ea"/>
+                <a:cs typeface="+mn-cs"/>
+              </a:rPr>
+              <a:t>App runs as its own STATELESS process </a:t>
+            </a:r>
+            <a:r>
+              <a:rPr lang="mr-IN" sz="2800" b="0" i="0" kern="1200" dirty="0" smtClean="0">
+                <a:solidFill>
+                  <a:schemeClr val="tx1"/>
+                </a:solidFill>
+                <a:effectLst/>
+                <a:latin typeface="+mn-lt"/>
+                <a:ea typeface="+mn-ea"/>
+                <a:cs typeface="+mn-cs"/>
+              </a:rPr>
+              <a:t>–</a:t>
+            </a:r>
+            <a:r>
+              <a:rPr lang="en-US" sz="2800" b="0" i="0" kern="1200" dirty="0" smtClean="0">
+                <a:solidFill>
+                  <a:schemeClr val="tx1"/>
+                </a:solidFill>
+                <a:effectLst/>
+                <a:latin typeface="+mn-lt"/>
+                <a:ea typeface="+mn-ea"/>
+                <a:cs typeface="+mn-cs"/>
+              </a:rPr>
+              <a:t> does not require any other processes to ru</a:t>
+            </a:r>
+            <a:r>
+              <a:rPr lang="en-US" sz="2800" dirty="0" smtClean="0"/>
+              <a:t>n it (like an App Server)</a:t>
+            </a:r>
+            <a:endParaRPr lang="en-US" sz="2800" b="0" i="0" kern="1200" dirty="0" smtClean="0">
+              <a:solidFill>
+                <a:schemeClr val="tx1"/>
+              </a:solidFill>
+              <a:effectLst/>
+              <a:latin typeface="+mn-lt"/>
+              <a:ea typeface="+mn-ea"/>
+              <a:cs typeface="+mn-cs"/>
+            </a:endParaRPr>
+          </a:p>
+        </p:txBody>
+      </p:sp>
+      <p:sp>
+        <p:nvSpPr>
+          <p:cNvPr id="5" name="TextBox 4"/>
+          <p:cNvSpPr txBox="1"/>
+          <p:nvPr/>
+        </p:nvSpPr>
+        <p:spPr>
+          <a:xfrm>
+            <a:off x="6096000" y="1825625"/>
+            <a:ext cx="6096000" cy="3970318"/>
+          </a:xfrm>
+          <a:prstGeom prst="rect">
+            <a:avLst/>
+          </a:prstGeom>
+          <a:noFill/>
+        </p:spPr>
+        <p:txBody>
+          <a:bodyPr wrap="square" rtlCol="0">
+            <a:spAutoFit/>
+          </a:bodyPr>
+          <a:lstStyle/>
+          <a:p>
+            <a:r>
+              <a:rPr lang="en-US" b="1" dirty="0"/>
+              <a:t>VII. Port </a:t>
+            </a:r>
+            <a:r>
+              <a:rPr lang="en-US" b="1" dirty="0" smtClean="0"/>
+              <a:t>binding </a:t>
+            </a:r>
+            <a:r>
+              <a:rPr lang="en-US" b="1" dirty="0"/>
+              <a:t>✅</a:t>
+            </a:r>
+            <a:endParaRPr lang="en-US" b="1" dirty="0" smtClean="0"/>
+          </a:p>
+          <a:p>
+            <a:r>
+              <a:rPr lang="en-US" dirty="0" smtClean="0"/>
+              <a:t>Exposes port 8080 by default so we can connect to it</a:t>
+            </a:r>
+            <a:endParaRPr lang="en-US" dirty="0"/>
+          </a:p>
+          <a:p>
+            <a:r>
+              <a:rPr lang="en-US" b="1" dirty="0"/>
+              <a:t>VIII. </a:t>
+            </a:r>
+            <a:r>
+              <a:rPr lang="en-US" b="1" dirty="0" smtClean="0"/>
+              <a:t>Concurrency </a:t>
+            </a:r>
+            <a:r>
+              <a:rPr lang="en-US" b="1" dirty="0"/>
+              <a:t>✅</a:t>
+            </a:r>
+            <a:endParaRPr lang="en-US" b="1" dirty="0"/>
+          </a:p>
+          <a:p>
+            <a:r>
+              <a:rPr lang="en-US" dirty="0" smtClean="0"/>
+              <a:t>Scaling our app is as easy as just spinning up new instances of it</a:t>
+            </a:r>
+            <a:endParaRPr lang="en-US" dirty="0"/>
+          </a:p>
+          <a:p>
+            <a:r>
+              <a:rPr lang="en-US" b="1" dirty="0"/>
+              <a:t>IX. </a:t>
+            </a:r>
+            <a:r>
+              <a:rPr lang="en-US" b="1" dirty="0" smtClean="0"/>
+              <a:t>Disposability </a:t>
+            </a:r>
+            <a:r>
+              <a:rPr lang="en-US" b="1" dirty="0"/>
+              <a:t>✅</a:t>
+            </a:r>
+            <a:endParaRPr lang="en-US" b="1" dirty="0"/>
+          </a:p>
+          <a:p>
+            <a:r>
+              <a:rPr lang="en-US" dirty="0" smtClean="0"/>
+              <a:t>Starting up and stopping our application is pretty fast (seconds, not minutes)</a:t>
+            </a:r>
+            <a:endParaRPr lang="en-US" dirty="0"/>
+          </a:p>
+          <a:p>
+            <a:r>
+              <a:rPr lang="en-US" b="1" dirty="0"/>
+              <a:t>X. Dev/prod </a:t>
+            </a:r>
+            <a:r>
+              <a:rPr lang="en-US" b="1" dirty="0" smtClean="0"/>
+              <a:t>parity ❌</a:t>
+            </a:r>
+          </a:p>
+          <a:p>
+            <a:r>
+              <a:rPr lang="en-US" dirty="0" smtClean="0"/>
+              <a:t>Will be handled by the PaaS and its tools</a:t>
+            </a:r>
+          </a:p>
+          <a:p>
+            <a:r>
+              <a:rPr lang="en-US" b="1" dirty="0" smtClean="0"/>
+              <a:t>XI</a:t>
+            </a:r>
+            <a:r>
+              <a:rPr lang="en-US" b="1" dirty="0"/>
+              <a:t>. </a:t>
+            </a:r>
+            <a:r>
+              <a:rPr lang="en-US" b="1" dirty="0"/>
+              <a:t>Logs </a:t>
+            </a:r>
+            <a:r>
+              <a:rPr lang="en-US" b="1" dirty="0" smtClean="0"/>
+              <a:t>✅</a:t>
+            </a:r>
+            <a:endParaRPr lang="en-US" b="1" dirty="0"/>
+          </a:p>
+          <a:p>
+            <a:r>
+              <a:rPr lang="en-US" dirty="0" smtClean="0"/>
+              <a:t>Logs get written to standard out/err by default</a:t>
+            </a:r>
+            <a:endParaRPr lang="en-US" dirty="0"/>
+          </a:p>
+          <a:p>
+            <a:r>
+              <a:rPr lang="en-US" b="1" dirty="0"/>
+              <a:t>XII. Admin </a:t>
+            </a:r>
+            <a:r>
+              <a:rPr lang="en-US" b="1" dirty="0"/>
+              <a:t>processes  </a:t>
+            </a:r>
+            <a:r>
+              <a:rPr lang="en-US" b="1" dirty="0" smtClean="0"/>
+              <a:t>❌</a:t>
+            </a:r>
+            <a:endParaRPr lang="en-US" b="1" dirty="0"/>
+          </a:p>
+          <a:p>
+            <a:r>
+              <a:rPr lang="en-US" dirty="0" smtClean="0"/>
+              <a:t>No admin processes for this demo</a:t>
+            </a:r>
+            <a:endParaRPr lang="en-US" dirty="0"/>
+          </a:p>
+          <a:p>
+            <a:endParaRPr lang="en-US" dirty="0"/>
+          </a:p>
+        </p:txBody>
+      </p:sp>
+    </p:spTree>
+    <p:extLst>
+      <p:ext uri="{BB962C8B-B14F-4D97-AF65-F5344CB8AC3E}">
+        <p14:creationId xmlns:p14="http://schemas.microsoft.com/office/powerpoint/2010/main" val="610359693"/>
+      </p:ext>
+    </p:extLst>
+  </p:cSld>
+  <p:clrMapOvr>
+    <a:masterClrMapping/>
+  </p:clrMapOvr>
+  <p:timing>
+    <p:tnLst>
+      <p:par>
+        <p:cTn id="1" dur="indefinite" restart="never" nodeType="tmRoot"/>
+      </p:par>
+    </p:tnLst>
+  </p:timing>
+</p:sld>
+</file>
+
+<file path=ppt/slides/slide14.xml><?xml version="1.0" encoding="utf-8"?>
+<p:sld xmlns:a="http://schemas.openxmlformats.org/drawingml/2006/main" xmlns:r="http://schemas.openxmlformats.org/officeDocument/2006/relationships" xmlns:p="http://schemas.openxmlformats.org/presentationml/2006/main">
+  <p:cSld>
+    <p:spTree>
+      <p:nvGrpSpPr>
+        <p:cNvPr id="1" name=""/>
+        <p:cNvGrpSpPr/>
+        <p:nvPr/>
+      </p:nvGrpSpPr>
+      <p:grpSpPr>
+        <a:xfrm>
+          <a:off x="0" y="0"/>
+          <a:ext cx="0" cy="0"/>
+          <a:chOff x="0" y="0"/>
+          <a:chExt cx="0" cy="0"/>
+        </a:xfrm>
+      </p:grpSpPr>
+      <p:sp>
+        <p:nvSpPr>
+          <p:cNvPr id="2" name="Title 1"/>
+          <p:cNvSpPr>
+            <a:spLocks noGrp="1"/>
+          </p:cNvSpPr>
+          <p:nvPr>
+            <p:ph type="title"/>
+          </p:nvPr>
+        </p:nvSpPr>
+        <p:spPr/>
+        <p:txBody>
+          <a:bodyPr/>
+          <a:lstStyle/>
+          <a:p>
+            <a:r>
+              <a:rPr lang="en-US" dirty="0" smtClean="0"/>
               <a:t>Deploy to </a:t>
             </a:r>
             <a:r>
@@ -5478,11 +6093,11 @@
               </a:rPr>
               <a:t>elements.heroku.com/addons</a:t>
             </a:r>
-            <a:endParaRPr lang="en-US" smtClean="0"/>
-          </a:p>
-          <a:p>
-            <a:r>
-              <a:rPr lang="en-US" smtClean="0"/>
+            <a:endParaRPr lang="en-US" dirty="0" smtClean="0"/>
+          </a:p>
+          <a:p>
+            <a:r>
+              <a:rPr lang="en-US" dirty="0" smtClean="0"/>
               <a:t> </a:t>
             </a:r>
             <a:endParaRPr lang="en-US" dirty="0"/>

</xml_diff>

<commit_message>
Updated presentation and Dockerfile
</commit_message>
<xml_diff>
--- a/presentation.pptx
+++ b/presentation.pptx
@@ -5,7 +5,7 @@
     <p:sldMasterId id="2147483935" r:id="rId1"/>
   </p:sldMasterIdLst>
   <p:notesMasterIdLst>
-    <p:notesMasterId r:id="rId16"/>
+    <p:notesMasterId r:id="rId17"/>
   </p:notesMasterIdLst>
   <p:sldIdLst>
     <p:sldId id="256" r:id="rId2"/>
@@ -22,6 +22,7 @@
     <p:sldId id="267" r:id="rId13"/>
     <p:sldId id="269" r:id="rId14"/>
     <p:sldId id="268" r:id="rId15"/>
+    <p:sldId id="270" r:id="rId16"/>
   </p:sldIdLst>
   <p:sldSz cx="12192000" cy="6858000"/>
   <p:notesSz cx="6858000" cy="9144000"/>
@@ -5798,7 +5799,31 @@
                 <a:ea typeface="+mn-ea"/>
                 <a:cs typeface="+mn-cs"/>
               </a:rPr>
-              <a:t> does not require any other processes to ru</a:t>
+              <a:t> </a:t>
+            </a:r>
+            <a:r>
+              <a:rPr lang="en-US" sz="2800" b="0" i="0" kern="1200" dirty="0" err="1" smtClean="0">
+                <a:solidFill>
+                  <a:schemeClr val="tx1"/>
+                </a:solidFill>
+                <a:effectLst/>
+                <a:latin typeface="+mn-lt"/>
+                <a:ea typeface="+mn-ea"/>
+                <a:cs typeface="+mn-cs"/>
+              </a:rPr>
+              <a:t>do❌es</a:t>
+            </a:r>
+            <a:r>
+              <a:rPr lang="en-US" sz="2800" b="0" i="0" kern="1200" dirty="0" smtClean="0">
+                <a:solidFill>
+                  <a:schemeClr val="tx1"/>
+                </a:solidFill>
+                <a:effectLst/>
+                <a:latin typeface="+mn-lt"/>
+                <a:ea typeface="+mn-ea"/>
+                <a:cs typeface="+mn-cs"/>
+              </a:rPr>
+              <a:t> not require any other processes to ru</a:t>
             </a:r>
             <a:r>
               <a:rPr lang="en-US" sz="2800" dirty="0" smtClean="0"/>
@@ -6121,6 +6146,87 @@
       </p:par>
     </p:tnLst>
   </p:timing>
+</p:sld>
+</file>
+
+<file path=ppt/slides/slide15.xml><?xml version="1.0" encoding="utf-8"?>
+<p:sld xmlns:a="http://schemas.openxmlformats.org/drawingml/2006/main" xmlns:r="http://schemas.openxmlformats.org/officeDocument/2006/relationships" xmlns:p="http://schemas.openxmlformats.org/presentationml/2006/main">
+  <p:cSld>
+    <p:spTree>
+      <p:nvGrpSpPr>
+        <p:cNvPr id="1" name=""/>
+        <p:cNvGrpSpPr/>
+        <p:nvPr/>
+      </p:nvGrpSpPr>
+      <p:grpSpPr>
+        <a:xfrm>
+          <a:off x="0" y="0"/>
+          <a:ext cx="0" cy="0"/>
+          <a:chOff x="0" y="0"/>
+          <a:chExt cx="0" cy="0"/>
+        </a:xfrm>
+      </p:grpSpPr>
+      <p:sp>
+        <p:nvSpPr>
+          <p:cNvPr id="2" name="Title 1"/>
+          <p:cNvSpPr>
+            <a:spLocks noGrp="1"/>
+          </p:cNvSpPr>
+          <p:nvPr>
+            <p:ph type="title"/>
+          </p:nvPr>
+        </p:nvSpPr>
+        <p:spPr/>
+        <p:txBody>
+          <a:bodyPr/>
+          <a:lstStyle/>
+          <a:p>
+            <a:r>
+              <a:rPr lang="en-US" dirty="0" smtClean="0"/>
+              <a:t>Questions?</a:t>
+            </a:r>
+            <a:endParaRPr lang="en-US" dirty="0"/>
+          </a:p>
+        </p:txBody>
+      </p:sp>
+      <p:sp>
+        <p:nvSpPr>
+          <p:cNvPr id="3" name="Content Placeholder 2"/>
+          <p:cNvSpPr>
+            <a:spLocks noGrp="1"/>
+          </p:cNvSpPr>
+          <p:nvPr>
+            <p:ph idx="1"/>
+          </p:nvPr>
+        </p:nvSpPr>
+        <p:spPr/>
+        <p:txBody>
+          <a:bodyPr>
+            <a:normAutofit/>
+          </a:bodyPr>
+          <a:lstStyle/>
+          <a:p>
+            <a:pPr marL="0" indent="0" algn="ctr">
+              <a:buNone/>
+            </a:pPr>
+            <a:r>
+              <a:rPr lang="en-US" sz="14000" b="1" dirty="0" smtClean="0"/>
+              <a:t>???</a:t>
+            </a:r>
+            <a:endParaRPr lang="en-US" sz="14000" b="1" dirty="0"/>
+          </a:p>
+        </p:txBody>
+      </p:sp>
+    </p:spTree>
+    <p:extLst>
+      <p:ext uri="{BB962C8B-B14F-4D97-AF65-F5344CB8AC3E}">
+        <p14:creationId xmlns:p14="http://schemas.microsoft.com/office/powerpoint/2010/main" val="174152883"/>
+      </p:ext>
+    </p:extLst>
+  </p:cSld>
+  <p:clrMapOvr>
+    <a:masterClrMapping/>
+  </p:clrMapOvr>
 </p:sld>
 </file>
 

</xml_diff>

<commit_message>
Updated Cloud Native slide
</commit_message>
<xml_diff>
--- a/presentation.pptx
+++ b/presentation.pptx
@@ -6376,82 +6376,35 @@
           </a:p>
         </p:txBody>
       </p:sp>
-      <p:sp>
-        <p:nvSpPr>
-          <p:cNvPr id="3" name="Content Placeholder 2"/>
-          <p:cNvSpPr>
-            <a:spLocks noGrp="1"/>
-          </p:cNvSpPr>
+      <p:pic>
+        <p:nvPicPr>
+          <p:cNvPr id="4" name="Content Placeholder 3"/>
+          <p:cNvPicPr>
+            <a:picLocks noGrp="1" noChangeAspect="1"/>
+          </p:cNvPicPr>
           <p:nvPr>
             <p:ph idx="1"/>
           </p:nvPr>
-        </p:nvSpPr>
-        <p:spPr/>
-        <p:txBody>
-          <a:bodyPr>
-            <a:normAutofit fontScale="92500" lnSpcReduction="20000"/>
-          </a:bodyPr>
-          <a:lstStyle/>
-          <a:p>
-            <a:r>
-              <a:rPr lang="en-US" dirty="0" smtClean="0"/>
-              <a:t>Latency-Aware</a:t>
-            </a:r>
-            <a:endParaRPr lang="en-US" dirty="0"/>
-          </a:p>
-          <a:p>
-            <a:r>
-              <a:rPr lang="en-US" dirty="0" smtClean="0"/>
-              <a:t>Instrumented</a:t>
-            </a:r>
-            <a:endParaRPr lang="en-US" dirty="0"/>
-          </a:p>
-          <a:p>
-            <a:r>
-              <a:rPr lang="en-US" dirty="0" smtClean="0"/>
-              <a:t>Failure-Aware</a:t>
-            </a:r>
-            <a:endParaRPr lang="en-US" dirty="0"/>
-          </a:p>
-          <a:p>
-            <a:pPr lvl="0"/>
-            <a:r>
-              <a:rPr lang="en-US" dirty="0" smtClean="0"/>
-              <a:t>Event-driven</a:t>
-            </a:r>
-            <a:endParaRPr lang="en-US" dirty="0"/>
-          </a:p>
-          <a:p>
-            <a:pPr lvl="0"/>
-            <a:r>
-              <a:rPr lang="en-US" dirty="0" smtClean="0"/>
-              <a:t>Secure</a:t>
-            </a:r>
-            <a:endParaRPr lang="en-US" dirty="0"/>
-          </a:p>
-          <a:p>
-            <a:r>
-              <a:rPr lang="en-US" dirty="0" smtClean="0"/>
-              <a:t>Parallelizable</a:t>
-            </a:r>
-            <a:endParaRPr lang="en-US" dirty="0"/>
-          </a:p>
-          <a:p>
-            <a:r>
-              <a:rPr lang="en-US" dirty="0" smtClean="0"/>
-              <a:t>Automated</a:t>
-            </a:r>
-            <a:endParaRPr lang="en-US" dirty="0"/>
-          </a:p>
-          <a:p>
-            <a:r>
-              <a:rPr lang="en-US" dirty="0" smtClean="0"/>
-              <a:t>Resource-consumption-aware</a:t>
-            </a:r>
-            <a:endParaRPr lang="en-US" dirty="0"/>
-          </a:p>
-        </p:txBody>
-      </p:sp>
+        </p:nvPicPr>
+        <p:blipFill>
+          <a:blip r:embed="rId3">
+            <a:extLst>
+              <a:ext uri="{28A0092B-C50C-407E-A947-70E740481C1C}">
+                <a14:useLocalDpi xmlns:a14="http://schemas.microsoft.com/office/drawing/2010/main" val="0"/>
+              </a:ext>
+            </a:extLst>
+          </a:blip>
+          <a:stretch>
+            <a:fillRect/>
+          </a:stretch>
+        </p:blipFill>
+        <p:spPr>
+          <a:xfrm>
+            <a:off x="4516716" y="2016125"/>
+            <a:ext cx="3472893" cy="3449638"/>
+          </a:xfrm>
+        </p:spPr>
+      </p:pic>
     </p:spTree>
     <p:extLst>
       <p:ext uri="{BB962C8B-B14F-4D97-AF65-F5344CB8AC3E}">

</xml_diff>

<commit_message>
Fixed error in presentation
</commit_message>
<xml_diff>
--- a/presentation.pptx
+++ b/presentation.pptx
@@ -211,7 +211,7 @@
           <a:p>
             <a:fld id="{F1A1B679-05D9-744D-922D-B12F6C4A659F}" type="datetimeFigureOut">
               <a:rPr lang="en-US" smtClean="0"/>
-              <a:t>3/20/17</a:t>
+              <a:t>3/21/17</a:t>
             </a:fld>
             <a:endParaRPr lang="en-US"/>
           </a:p>
@@ -870,7 +870,7 @@
           <a:p>
             <a:fld id="{810A55ED-2C5B-DB4C-9CAE-9392524F0298}" type="datetimeFigureOut">
               <a:rPr lang="en-US" smtClean="0"/>
-              <a:t>3/20/17</a:t>
+              <a:t>3/21/17</a:t>
             </a:fld>
             <a:endParaRPr lang="en-US"/>
           </a:p>
@@ -1076,7 +1076,7 @@
           <a:p>
             <a:fld id="{810A55ED-2C5B-DB4C-9CAE-9392524F0298}" type="datetimeFigureOut">
               <a:rPr lang="en-US" smtClean="0"/>
-              <a:t>3/20/17</a:t>
+              <a:t>3/21/17</a:t>
             </a:fld>
             <a:endParaRPr lang="en-US"/>
           </a:p>
@@ -1286,7 +1286,7 @@
           <a:p>
             <a:fld id="{810A55ED-2C5B-DB4C-9CAE-9392524F0298}" type="datetimeFigureOut">
               <a:rPr lang="en-US" smtClean="0"/>
-              <a:t>3/20/17</a:t>
+              <a:t>3/21/17</a:t>
             </a:fld>
             <a:endParaRPr lang="en-US"/>
           </a:p>
@@ -1482,7 +1482,7 @@
           <a:p>
             <a:fld id="{810A55ED-2C5B-DB4C-9CAE-9392524F0298}" type="datetimeFigureOut">
               <a:rPr lang="en-US" smtClean="0"/>
-              <a:t>3/20/17</a:t>
+              <a:t>3/21/17</a:t>
             </a:fld>
             <a:endParaRPr lang="en-US"/>
           </a:p>
@@ -1756,7 +1756,7 @@
           <a:p>
             <a:fld id="{810A55ED-2C5B-DB4C-9CAE-9392524F0298}" type="datetimeFigureOut">
               <a:rPr lang="en-US" smtClean="0"/>
-              <a:t>3/20/17</a:t>
+              <a:t>3/21/17</a:t>
             </a:fld>
             <a:endParaRPr lang="en-US"/>
           </a:p>
@@ -2019,7 +2019,7 @@
           <a:p>
             <a:fld id="{810A55ED-2C5B-DB4C-9CAE-9392524F0298}" type="datetimeFigureOut">
               <a:rPr lang="en-US" smtClean="0"/>
-              <a:t>3/20/17</a:t>
+              <a:t>3/21/17</a:t>
             </a:fld>
             <a:endParaRPr lang="en-US"/>
           </a:p>
@@ -2435,7 +2435,7 @@
           <a:p>
             <a:fld id="{810A55ED-2C5B-DB4C-9CAE-9392524F0298}" type="datetimeFigureOut">
               <a:rPr lang="en-US" smtClean="0"/>
-              <a:t>3/20/17</a:t>
+              <a:t>3/21/17</a:t>
             </a:fld>
             <a:endParaRPr lang="en-US"/>
           </a:p>
@@ -2584,7 +2584,7 @@
           <a:p>
             <a:fld id="{810A55ED-2C5B-DB4C-9CAE-9392524F0298}" type="datetimeFigureOut">
               <a:rPr lang="en-US" smtClean="0"/>
-              <a:t>3/20/17</a:t>
+              <a:t>3/21/17</a:t>
             </a:fld>
             <a:endParaRPr lang="en-US"/>
           </a:p>
@@ -2705,7 +2705,7 @@
           <a:p>
             <a:fld id="{810A55ED-2C5B-DB4C-9CAE-9392524F0298}" type="datetimeFigureOut">
               <a:rPr lang="en-US" smtClean="0"/>
-              <a:t>3/20/17</a:t>
+              <a:t>3/21/17</a:t>
             </a:fld>
             <a:endParaRPr lang="en-US"/>
           </a:p>
@@ -2951,7 +2951,7 @@
           <a:p>
             <a:fld id="{810A55ED-2C5B-DB4C-9CAE-9392524F0298}" type="datetimeFigureOut">
               <a:rPr lang="en-US" smtClean="0"/>
-              <a:t>3/20/17</a:t>
+              <a:t>3/21/17</a:t>
             </a:fld>
             <a:endParaRPr lang="en-US"/>
           </a:p>
@@ -3396,7 +3396,7 @@
           <a:p>
             <a:fld id="{810A55ED-2C5B-DB4C-9CAE-9392524F0298}" type="datetimeFigureOut">
               <a:rPr lang="en-US" smtClean="0"/>
-              <a:t>3/20/17</a:t>
+              <a:t>3/21/17</a:t>
             </a:fld>
             <a:endParaRPr lang="en-US"/>
           </a:p>
@@ -3717,7 +3717,7 @@
           <a:p>
             <a:fld id="{810A55ED-2C5B-DB4C-9CAE-9392524F0298}" type="datetimeFigureOut">
               <a:rPr lang="en-US" smtClean="0"/>
-              <a:t>3/20/17</a:t>
+              <a:t>3/21/17</a:t>
             </a:fld>
             <a:endParaRPr lang="en-US"/>
           </a:p>
@@ -5200,11 +5200,7 @@
           <a:p>
             <a:r>
               <a:rPr lang="en-US" dirty="0" smtClean="0"/>
-              <a:t>Demo Time</a:t>
-            </a:r>
-            <a:r>
-              <a:rPr lang="en-US" dirty="0" smtClean="0"/>
-              <a:t>!</a:t>
+              <a:t>Demo Time!</a:t>
             </a:r>
           </a:p>
           <a:p>
@@ -5413,11 +5409,7 @@
           <a:p>
             <a:r>
               <a:rPr lang="en-US" dirty="0" smtClean="0"/>
-              <a:t>Matching Back to</a:t>
-            </a:r>
-            <a:r>
-              <a:rPr lang="en-US" dirty="0" smtClean="0"/>
-              <a:t> 12-Factor</a:t>
+              <a:t>Matching Back to 12-Factor</a:t>
             </a:r>
             <a:endParaRPr lang="en-US" dirty="0"/>
           </a:p>
@@ -5530,10 +5522,6 @@
               <a:rPr lang="en-US" sz="2800" b="1" dirty="0" smtClean="0"/>
               <a:t>Dependencies ✅ </a:t>
             </a:r>
-            <a:r>
-              <a:rPr lang="en-US" sz="2800" b="1" dirty="0" smtClean="0"/>
-              <a:t/>
-            </a:r>
             <a:br>
               <a:rPr lang="en-US" sz="2800" b="1" dirty="0" smtClean="0"/>
             </a:br>
@@ -5616,10 +5604,6 @@
               <a:rPr lang="en-US" sz="2800" b="1" dirty="0" smtClean="0"/>
               <a:t> ✅ </a:t>
             </a:r>
-            <a:r>
-              <a:rPr lang="en-US" sz="2800" b="1" dirty="0" smtClean="0"/>
-              <a:t/>
-            </a:r>
             <a:br>
               <a:rPr lang="en-US" sz="2800" b="1" dirty="0" smtClean="0"/>
             </a:br>
@@ -5662,10 +5646,6 @@
               <a:rPr lang="en-US" sz="2800" b="1" dirty="0" smtClean="0"/>
               <a:t>services ✅ </a:t>
             </a:r>
-            <a:r>
-              <a:rPr lang="en-US" sz="2800" b="1" dirty="0" smtClean="0"/>
-              <a:t/>
-            </a:r>
             <a:br>
               <a:rPr lang="en-US" sz="2800" b="1" dirty="0" smtClean="0"/>
             </a:br>
@@ -5758,10 +5738,6 @@
               <a:rPr lang="en-US" sz="2800" b="1" dirty="0" smtClean="0"/>
               <a:t>Processes ✅ </a:t>
             </a:r>
-            <a:r>
-              <a:rPr lang="en-US" sz="2800" b="1" dirty="0" smtClean="0"/>
-              <a:t/>
-            </a:r>
             <a:br>
               <a:rPr lang="en-US" sz="2800" b="1" dirty="0" smtClean="0"/>
             </a:br>
@@ -5790,6 +5766,30 @@
               <a:t>–</a:t>
             </a:r>
             <a:r>
+              <a:rPr lang="en-US" sz="2800" b="0" i="0" kern="1200" smtClean="0">
+                <a:solidFill>
+                  <a:schemeClr val="tx1"/>
+                </a:solidFill>
+                <a:effectLst/>
+                <a:latin typeface="+mn-lt"/>
+                <a:ea typeface="+mn-ea"/>
+                <a:cs typeface="+mn-cs"/>
+              </a:rPr>
+              <a:t> </a:t>
+            </a:r>
+            <a:r>
+              <a:rPr lang="en-US" sz="2800" b="0" i="0" kern="1200" smtClean="0">
+                <a:solidFill>
+                  <a:schemeClr val="tx1"/>
+                </a:solidFill>
+                <a:effectLst/>
+                <a:latin typeface="+mn-lt"/>
+                <a:ea typeface="+mn-ea"/>
+                <a:cs typeface="+mn-cs"/>
+              </a:rPr>
+              <a:t>does </a:t>
+            </a:r>
+            <a:r>
               <a:rPr lang="en-US" sz="2800" b="0" i="0" kern="1200" dirty="0" smtClean="0">
                 <a:solidFill>
                   <a:schemeClr val="tx1"/>
@@ -5799,31 +5799,7 @@
                 <a:ea typeface="+mn-ea"/>
                 <a:cs typeface="+mn-cs"/>
               </a:rPr>
-              <a:t> </a:t>
-            </a:r>
-            <a:r>
-              <a:rPr lang="en-US" sz="2800" b="0" i="0" kern="1200" dirty="0" err="1" smtClean="0">
-                <a:solidFill>
-                  <a:schemeClr val="tx1"/>
-                </a:solidFill>
-                <a:effectLst/>
-                <a:latin typeface="+mn-lt"/>
-                <a:ea typeface="+mn-ea"/>
-                <a:cs typeface="+mn-cs"/>
-              </a:rPr>
-              <a:t>do❌es</a:t>
-            </a:r>
-            <a:r>
-              <a:rPr lang="en-US" sz="2800" b="0" i="0" kern="1200" dirty="0" smtClean="0">
-                <a:solidFill>
-                  <a:schemeClr val="tx1"/>
-                </a:solidFill>
-                <a:effectLst/>
-                <a:latin typeface="+mn-lt"/>
-                <a:ea typeface="+mn-ea"/>
-                <a:cs typeface="+mn-cs"/>
-              </a:rPr>
-              <a:t> not require any other processes to ru</a:t>
+              <a:t>not require any other processes to ru</a:t>
             </a:r>
             <a:r>
               <a:rPr lang="en-US" sz="2800" dirty="0" smtClean="0"/>
@@ -5897,7 +5873,6 @@
               <a:rPr lang="en-US" b="1" dirty="0"/>
               <a:t>✅</a:t>
             </a:r>
-            <a:endParaRPr lang="en-US" b="1" dirty="0"/>
           </a:p>
           <a:p>
             <a:r>
@@ -5919,7 +5894,6 @@
               <a:rPr lang="en-US" b="1" dirty="0"/>
               <a:t>✅</a:t>
             </a:r>
-            <a:endParaRPr lang="en-US" b="1" dirty="0"/>
           </a:p>
           <a:p>
             <a:r>
@@ -5951,11 +5925,7 @@
             </a:r>
             <a:r>
               <a:rPr lang="en-US" b="1" dirty="0"/>
-              <a:t>. </a:t>
-            </a:r>
-            <a:r>
-              <a:rPr lang="en-US" b="1" dirty="0"/>
-              <a:t>Logs </a:t>
+              <a:t>. Logs </a:t>
             </a:r>
             <a:r>
               <a:rPr lang="en-US" b="1" dirty="0" smtClean="0"/>
@@ -5973,11 +5943,7 @@
           <a:p>
             <a:r>
               <a:rPr lang="en-US" b="1" dirty="0"/>
-              <a:t>XII. Admin </a:t>
-            </a:r>
-            <a:r>
-              <a:rPr lang="en-US" b="1" dirty="0"/>
-              <a:t>processes  </a:t>
+              <a:t>XII. Admin processes  </a:t>
             </a:r>
             <a:r>
               <a:rPr lang="en-US" b="1" dirty="0" smtClean="0"/>

</xml_diff>

<commit_message>
Updated Spring demo by locking version; Updated presentation
</commit_message>
<xml_diff>
--- a/presentation.pptx
+++ b/presentation.pptx
@@ -211,7 +211,7 @@
           <a:p>
             <a:fld id="{F1A1B679-05D9-744D-922D-B12F6C4A659F}" type="datetimeFigureOut">
               <a:rPr lang="en-US" smtClean="0"/>
-              <a:t>3/21/17</a:t>
+              <a:t>3/22/17</a:t>
             </a:fld>
             <a:endParaRPr lang="en-US"/>
           </a:p>
@@ -870,7 +870,7 @@
           <a:p>
             <a:fld id="{810A55ED-2C5B-DB4C-9CAE-9392524F0298}" type="datetimeFigureOut">
               <a:rPr lang="en-US" smtClean="0"/>
-              <a:t>3/21/17</a:t>
+              <a:t>3/22/17</a:t>
             </a:fld>
             <a:endParaRPr lang="en-US"/>
           </a:p>
@@ -1076,7 +1076,7 @@
           <a:p>
             <a:fld id="{810A55ED-2C5B-DB4C-9CAE-9392524F0298}" type="datetimeFigureOut">
               <a:rPr lang="en-US" smtClean="0"/>
-              <a:t>3/21/17</a:t>
+              <a:t>3/22/17</a:t>
             </a:fld>
             <a:endParaRPr lang="en-US"/>
           </a:p>
@@ -1286,7 +1286,7 @@
           <a:p>
             <a:fld id="{810A55ED-2C5B-DB4C-9CAE-9392524F0298}" type="datetimeFigureOut">
               <a:rPr lang="en-US" smtClean="0"/>
-              <a:t>3/21/17</a:t>
+              <a:t>3/22/17</a:t>
             </a:fld>
             <a:endParaRPr lang="en-US"/>
           </a:p>
@@ -1482,7 +1482,7 @@
           <a:p>
             <a:fld id="{810A55ED-2C5B-DB4C-9CAE-9392524F0298}" type="datetimeFigureOut">
               <a:rPr lang="en-US" smtClean="0"/>
-              <a:t>3/21/17</a:t>
+              <a:t>3/22/17</a:t>
             </a:fld>
             <a:endParaRPr lang="en-US"/>
           </a:p>
@@ -1756,7 +1756,7 @@
           <a:p>
             <a:fld id="{810A55ED-2C5B-DB4C-9CAE-9392524F0298}" type="datetimeFigureOut">
               <a:rPr lang="en-US" smtClean="0"/>
-              <a:t>3/21/17</a:t>
+              <a:t>3/22/17</a:t>
             </a:fld>
             <a:endParaRPr lang="en-US"/>
           </a:p>
@@ -2019,7 +2019,7 @@
           <a:p>
             <a:fld id="{810A55ED-2C5B-DB4C-9CAE-9392524F0298}" type="datetimeFigureOut">
               <a:rPr lang="en-US" smtClean="0"/>
-              <a:t>3/21/17</a:t>
+              <a:t>3/22/17</a:t>
             </a:fld>
             <a:endParaRPr lang="en-US"/>
           </a:p>
@@ -2435,7 +2435,7 @@
           <a:p>
             <a:fld id="{810A55ED-2C5B-DB4C-9CAE-9392524F0298}" type="datetimeFigureOut">
               <a:rPr lang="en-US" smtClean="0"/>
-              <a:t>3/21/17</a:t>
+              <a:t>3/22/17</a:t>
             </a:fld>
             <a:endParaRPr lang="en-US"/>
           </a:p>
@@ -2584,7 +2584,7 @@
           <a:p>
             <a:fld id="{810A55ED-2C5B-DB4C-9CAE-9392524F0298}" type="datetimeFigureOut">
               <a:rPr lang="en-US" smtClean="0"/>
-              <a:t>3/21/17</a:t>
+              <a:t>3/22/17</a:t>
             </a:fld>
             <a:endParaRPr lang="en-US"/>
           </a:p>
@@ -2705,7 +2705,7 @@
           <a:p>
             <a:fld id="{810A55ED-2C5B-DB4C-9CAE-9392524F0298}" type="datetimeFigureOut">
               <a:rPr lang="en-US" smtClean="0"/>
-              <a:t>3/21/17</a:t>
+              <a:t>3/22/17</a:t>
             </a:fld>
             <a:endParaRPr lang="en-US"/>
           </a:p>
@@ -2951,7 +2951,7 @@
           <a:p>
             <a:fld id="{810A55ED-2C5B-DB4C-9CAE-9392524F0298}" type="datetimeFigureOut">
               <a:rPr lang="en-US" smtClean="0"/>
-              <a:t>3/21/17</a:t>
+              <a:t>3/22/17</a:t>
             </a:fld>
             <a:endParaRPr lang="en-US"/>
           </a:p>
@@ -3396,7 +3396,7 @@
           <a:p>
             <a:fld id="{810A55ED-2C5B-DB4C-9CAE-9392524F0298}" type="datetimeFigureOut">
               <a:rPr lang="en-US" smtClean="0"/>
-              <a:t>3/21/17</a:t>
+              <a:t>3/22/17</a:t>
             </a:fld>
             <a:endParaRPr lang="en-US"/>
           </a:p>
@@ -3717,7 +3717,7 @@
           <a:p>
             <a:fld id="{810A55ED-2C5B-DB4C-9CAE-9392524F0298}" type="datetimeFigureOut">
               <a:rPr lang="en-US" smtClean="0"/>
-              <a:t>3/21/17</a:t>
+              <a:t>3/22/17</a:t>
             </a:fld>
             <a:endParaRPr lang="en-US"/>
           </a:p>
@@ -5766,30 +5766,6 @@
               <a:t>–</a:t>
             </a:r>
             <a:r>
-              <a:rPr lang="en-US" sz="2800" b="0" i="0" kern="1200" smtClean="0">
-                <a:solidFill>
-                  <a:schemeClr val="tx1"/>
-                </a:solidFill>
-                <a:effectLst/>
-                <a:latin typeface="+mn-lt"/>
-                <a:ea typeface="+mn-ea"/>
-                <a:cs typeface="+mn-cs"/>
-              </a:rPr>
-              <a:t> </a:t>
-            </a:r>
-            <a:r>
-              <a:rPr lang="en-US" sz="2800" b="0" i="0" kern="1200" smtClean="0">
-                <a:solidFill>
-                  <a:schemeClr val="tx1"/>
-                </a:solidFill>
-                <a:effectLst/>
-                <a:latin typeface="+mn-lt"/>
-                <a:ea typeface="+mn-ea"/>
-                <a:cs typeface="+mn-cs"/>
-              </a:rPr>
-              <a:t>does </a:t>
-            </a:r>
-            <a:r>
               <a:rPr lang="en-US" sz="2800" b="0" i="0" kern="1200" dirty="0" smtClean="0">
                 <a:solidFill>
                   <a:schemeClr val="tx1"/>
@@ -5799,7 +5775,7 @@
                 <a:ea typeface="+mn-ea"/>
                 <a:cs typeface="+mn-cs"/>
               </a:rPr>
-              <a:t>not require any other processes to ru</a:t>
+              <a:t> does not require any other processes to ru</a:t>
             </a:r>
             <a:r>
               <a:rPr lang="en-US" sz="2800" dirty="0" smtClean="0"/>
@@ -6086,13 +6062,6 @@
             </a:r>
             <a:endParaRPr lang="en-US" dirty="0" smtClean="0"/>
           </a:p>
-          <a:p>
-            <a:r>
-              <a:rPr lang="en-US" dirty="0" smtClean="0"/>
-              <a:t> </a:t>
-            </a:r>
-            <a:endParaRPr lang="en-US" dirty="0"/>
-          </a:p>
         </p:txBody>
       </p:sp>
     </p:spTree>
@@ -6165,7 +6134,12 @@
             <p:ph idx="1"/>
           </p:nvPr>
         </p:nvSpPr>
-        <p:spPr/>
+        <p:spPr>
+          <a:xfrm>
+            <a:off x="1451579" y="2015732"/>
+            <a:ext cx="9603275" cy="2722523"/>
+          </a:xfrm>
+        </p:spPr>
         <p:txBody>
           <a:bodyPr>
             <a:normAutofit/>
@@ -6180,6 +6154,59 @@
               <a:t>???</a:t>
             </a:r>
             <a:endParaRPr lang="en-US" sz="14000" b="1" dirty="0"/>
+          </a:p>
+        </p:txBody>
+      </p:sp>
+      <p:sp>
+        <p:nvSpPr>
+          <p:cNvPr id="4" name="TextBox 3"/>
+          <p:cNvSpPr txBox="1"/>
+          <p:nvPr/>
+        </p:nvSpPr>
+        <p:spPr>
+          <a:xfrm>
+            <a:off x="6602545" y="5458691"/>
+            <a:ext cx="4452309" cy="646331"/>
+          </a:xfrm>
+          <a:prstGeom prst="rect">
+            <a:avLst/>
+          </a:prstGeom>
+          <a:noFill/>
+        </p:spPr>
+        <p:txBody>
+          <a:bodyPr wrap="none" rtlCol="0">
+            <a:spAutoFit/>
+          </a:bodyPr>
+          <a:lstStyle/>
+          <a:p>
+            <a:r>
+              <a:rPr lang="en-US" dirty="0" smtClean="0"/>
+              <a:t>Presentation + Working </a:t>
+            </a:r>
+            <a:r>
+              <a:rPr lang="en-US" dirty="0"/>
+              <a:t>demo available at:</a:t>
+            </a:r>
+            <a:br>
+              <a:rPr lang="en-US" dirty="0"/>
+            </a:br>
+            <a:r>
+              <a:rPr lang="en-US" dirty="0">
+                <a:hlinkClick r:id="rId2"/>
+              </a:rPr>
+              <a:t>https://</a:t>
+            </a:r>
+            <a:r>
+              <a:rPr lang="en-US" dirty="0" smtClean="0">
+                <a:hlinkClick r:id="rId2"/>
+              </a:rPr>
+              <a:t>github.com/EtienneK/arch-f2f-2017-03</a:t>
+            </a:r>
+            <a:r>
+              <a:rPr lang="en-US" dirty="0" smtClean="0"/>
+              <a:t> </a:t>
+            </a:r>
+            <a:endParaRPr lang="en-US" dirty="0"/>
           </a:p>
         </p:txBody>
       </p:sp>
@@ -6193,6 +6220,13 @@
   <p:clrMapOvr>
     <a:masterClrMapping/>
   </p:clrMapOvr>
+  <p:timing>
+    <p:tnLst>
+      <p:par>
+        <p:cTn id="1" dur="indefinite" restart="never" nodeType="tmRoot"/>
+      </p:par>
+    </p:tnLst>
+  </p:timing>
 </p:sld>
 </file>
 

</xml_diff>